<commit_message>
report add twine graphs
</commit_message>
<xml_diff>
--- a/Report.pptx
+++ b/Report.pptx
@@ -115,6 +115,22 @@
       </a:defRPr>
     </a:lvl9pPr>
   </p:defaultTextStyle>
+  <p:extLst>
+    <p:ext uri="{EFAFB233-063F-42B5-8137-9DF3F51BA10A}">
+      <p15:sldGuideLst xmlns:p15="http://schemas.microsoft.com/office/powerpoint/2012/main">
+        <p15:guide id="1" orient="horz" pos="2160">
+          <p15:clr>
+            <a:srgbClr val="A4A3A4"/>
+          </p15:clr>
+        </p15:guide>
+        <p15:guide id="2" pos="2880">
+          <p15:clr>
+            <a:srgbClr val="A4A3A4"/>
+          </p15:clr>
+        </p15:guide>
+      </p15:sldGuideLst>
+    </p:ext>
+  </p:extLst>
 </p:presentation>
 </file>
 
@@ -246,14 +262,12 @@
         <p:spPr/>
         <p:txBody>
           <a:bodyPr/>
-          <a:lstStyle>
-            <a:extLst/>
-          </a:lstStyle>
+          <a:lstStyle/>
           <a:p>
             <a:fld id="{5BBEAD13-0566-4C6C-97E7-55F17F24B09F}" type="datetimeFigureOut">
               <a:rPr lang="zh-TW" altLang="en-US" smtClean="0"/>
               <a:pPr/>
-              <a:t>2020/7/2</a:t>
+              <a:t>2020/7/3</a:t>
             </a:fld>
             <a:endParaRPr lang="zh-TW" altLang="en-US"/>
           </a:p>
@@ -272,9 +286,7 @@
         <p:spPr/>
         <p:txBody>
           <a:bodyPr/>
-          <a:lstStyle>
-            <a:extLst/>
-          </a:lstStyle>
+          <a:lstStyle/>
           <a:p>
             <a:endParaRPr lang="zh-TW" altLang="en-US"/>
           </a:p>
@@ -293,9 +305,7 @@
         <p:spPr/>
         <p:txBody>
           <a:bodyPr/>
-          <a:lstStyle>
-            <a:extLst/>
-          </a:lstStyle>
+          <a:lstStyle/>
           <a:p>
             <a:fld id="{73DA0BB7-265A-403C-9275-D587AB510EDC}" type="slidenum">
               <a:rPr lang="zh-TW" altLang="en-US" smtClean="0"/>
@@ -384,9 +394,7 @@
         </p:style>
         <p:txBody>
           <a:bodyPr anchor="ctr"/>
-          <a:lstStyle>
-            <a:extLst/>
-          </a:lstStyle>
+          <a:lstStyle/>
           <a:p>
             <a:pPr algn="ctr" eaLnBrk="1" latinLnBrk="0" hangingPunct="1"/>
             <a:endParaRPr kumimoji="0" lang="en-US"/>
@@ -435,9 +443,7 @@
         </p:style>
         <p:txBody>
           <a:bodyPr anchor="ctr"/>
-          <a:lstStyle>
-            <a:extLst/>
-          </a:lstStyle>
+          <a:lstStyle/>
           <a:p>
             <a:pPr algn="ctr" eaLnBrk="1" latinLnBrk="0" hangingPunct="1"/>
             <a:endParaRPr kumimoji="0" lang="en-US"/>
@@ -482,9 +488,7 @@
         <p:spPr/>
         <p:txBody>
           <a:bodyPr/>
-          <a:lstStyle>
-            <a:extLst/>
-          </a:lstStyle>
+          <a:lstStyle/>
           <a:p>
             <a:r>
               <a:rPr kumimoji="0" lang="zh-TW" altLang="en-US" smtClean="0"/>
@@ -507,9 +511,7 @@
         <p:spPr/>
         <p:txBody>
           <a:bodyPr vert="eaVert"/>
-          <a:lstStyle>
-            <a:extLst/>
-          </a:lstStyle>
+          <a:lstStyle/>
           <a:p>
             <a:pPr lvl="0" eaLnBrk="1" latinLnBrk="0" hangingPunct="1"/>
             <a:r>
@@ -561,14 +563,12 @@
         <p:spPr/>
         <p:txBody>
           <a:bodyPr/>
-          <a:lstStyle>
-            <a:extLst/>
-          </a:lstStyle>
+          <a:lstStyle/>
           <a:p>
             <a:fld id="{5BBEAD13-0566-4C6C-97E7-55F17F24B09F}" type="datetimeFigureOut">
               <a:rPr lang="zh-TW" altLang="en-US" smtClean="0"/>
               <a:pPr/>
-              <a:t>2020/7/2</a:t>
+              <a:t>2020/7/3</a:t>
             </a:fld>
             <a:endParaRPr lang="zh-TW" altLang="en-US"/>
           </a:p>
@@ -587,9 +587,7 @@
         <p:spPr/>
         <p:txBody>
           <a:bodyPr/>
-          <a:lstStyle>
-            <a:extLst/>
-          </a:lstStyle>
+          <a:lstStyle/>
           <a:p>
             <a:endParaRPr lang="zh-TW" altLang="en-US"/>
           </a:p>
@@ -608,9 +606,7 @@
         <p:spPr/>
         <p:txBody>
           <a:bodyPr/>
-          <a:lstStyle>
-            <a:extLst/>
-          </a:lstStyle>
+          <a:lstStyle/>
           <a:p>
             <a:fld id="{73DA0BB7-265A-403C-9275-D587AB510EDC}" type="slidenum">
               <a:rPr lang="zh-TW" altLang="en-US" smtClean="0"/>
@@ -664,9 +660,7 @@
         </p:spPr>
         <p:txBody>
           <a:bodyPr vert="eaVert"/>
-          <a:lstStyle>
-            <a:extLst/>
-          </a:lstStyle>
+          <a:lstStyle/>
           <a:p>
             <a:r>
               <a:rPr kumimoji="0" lang="zh-TW" altLang="en-US" smtClean="0"/>
@@ -694,9 +688,7 @@
         </p:spPr>
         <p:txBody>
           <a:bodyPr vert="eaVert"/>
-          <a:lstStyle>
-            <a:extLst/>
-          </a:lstStyle>
+          <a:lstStyle/>
           <a:p>
             <a:pPr lvl="0" eaLnBrk="1" latinLnBrk="0" hangingPunct="1"/>
             <a:r>
@@ -748,14 +740,12 @@
         <p:spPr/>
         <p:txBody>
           <a:bodyPr/>
-          <a:lstStyle>
-            <a:extLst/>
-          </a:lstStyle>
+          <a:lstStyle/>
           <a:p>
             <a:fld id="{5BBEAD13-0566-4C6C-97E7-55F17F24B09F}" type="datetimeFigureOut">
               <a:rPr lang="zh-TW" altLang="en-US" smtClean="0"/>
               <a:pPr/>
-              <a:t>2020/7/2</a:t>
+              <a:t>2020/7/3</a:t>
             </a:fld>
             <a:endParaRPr lang="zh-TW" altLang="en-US"/>
           </a:p>
@@ -774,9 +764,7 @@
         <p:spPr/>
         <p:txBody>
           <a:bodyPr/>
-          <a:lstStyle>
-            <a:extLst/>
-          </a:lstStyle>
+          <a:lstStyle/>
           <a:p>
             <a:endParaRPr lang="zh-TW" altLang="en-US"/>
           </a:p>
@@ -795,9 +783,7 @@
         <p:spPr/>
         <p:txBody>
           <a:bodyPr/>
-          <a:lstStyle>
-            <a:extLst/>
-          </a:lstStyle>
+          <a:lstStyle/>
           <a:p>
             <a:fld id="{73DA0BB7-265A-403C-9275-D587AB510EDC}" type="slidenum">
               <a:rPr lang="zh-TW" altLang="en-US" smtClean="0"/>
@@ -846,9 +832,7 @@
         <p:spPr/>
         <p:txBody>
           <a:bodyPr/>
-          <a:lstStyle>
-            <a:extLst/>
-          </a:lstStyle>
+          <a:lstStyle/>
           <a:p>
             <a:r>
               <a:rPr kumimoji="0" lang="zh-TW" altLang="en-US" smtClean="0"/>
@@ -871,9 +855,7 @@
         <p:spPr/>
         <p:txBody>
           <a:bodyPr/>
-          <a:lstStyle>
-            <a:extLst/>
-          </a:lstStyle>
+          <a:lstStyle/>
           <a:p>
             <a:pPr lvl="0" eaLnBrk="1" latinLnBrk="0" hangingPunct="1"/>
             <a:r>
@@ -925,14 +907,12 @@
         <p:spPr/>
         <p:txBody>
           <a:bodyPr/>
-          <a:lstStyle>
-            <a:extLst/>
-          </a:lstStyle>
+          <a:lstStyle/>
           <a:p>
             <a:fld id="{5BBEAD13-0566-4C6C-97E7-55F17F24B09F}" type="datetimeFigureOut">
               <a:rPr lang="zh-TW" altLang="en-US" smtClean="0"/>
               <a:pPr/>
-              <a:t>2020/7/2</a:t>
+              <a:t>2020/7/3</a:t>
             </a:fld>
             <a:endParaRPr lang="zh-TW" altLang="en-US"/>
           </a:p>
@@ -951,9 +931,7 @@
         <p:spPr/>
         <p:txBody>
           <a:bodyPr/>
-          <a:lstStyle>
-            <a:extLst/>
-          </a:lstStyle>
+          <a:lstStyle/>
           <a:p>
             <a:endParaRPr lang="zh-TW" altLang="en-US"/>
           </a:p>
@@ -972,9 +950,7 @@
         <p:spPr/>
         <p:txBody>
           <a:bodyPr/>
-          <a:lstStyle>
-            <a:extLst/>
-          </a:lstStyle>
+          <a:lstStyle/>
           <a:p>
             <a:fld id="{73DA0BB7-265A-403C-9275-D587AB510EDC}" type="slidenum">
               <a:rPr lang="zh-TW" altLang="en-US" smtClean="0"/>
@@ -1049,9 +1025,7 @@
         </p:style>
         <p:txBody>
           <a:bodyPr anchor="ctr"/>
-          <a:lstStyle>
-            <a:extLst/>
-          </a:lstStyle>
+          <a:lstStyle/>
           <a:p>
             <a:pPr algn="ctr" eaLnBrk="1" latinLnBrk="0" hangingPunct="1"/>
             <a:endParaRPr kumimoji="0" lang="en-US"/>
@@ -1195,14 +1169,12 @@
         <p:spPr/>
         <p:txBody>
           <a:bodyPr/>
-          <a:lstStyle>
-            <a:extLst/>
-          </a:lstStyle>
+          <a:lstStyle/>
           <a:p>
             <a:fld id="{5BBEAD13-0566-4C6C-97E7-55F17F24B09F}" type="datetimeFigureOut">
               <a:rPr lang="zh-TW" altLang="en-US" smtClean="0"/>
               <a:pPr/>
-              <a:t>2020/7/2</a:t>
+              <a:t>2020/7/3</a:t>
             </a:fld>
             <a:endParaRPr lang="zh-TW" altLang="en-US"/>
           </a:p>
@@ -1221,9 +1193,7 @@
         <p:spPr/>
         <p:txBody>
           <a:bodyPr/>
-          <a:lstStyle>
-            <a:extLst/>
-          </a:lstStyle>
+          <a:lstStyle/>
           <a:p>
             <a:endParaRPr lang="zh-TW" altLang="en-US"/>
           </a:p>
@@ -1242,9 +1212,7 @@
         <p:spPr/>
         <p:txBody>
           <a:bodyPr/>
-          <a:lstStyle>
-            <a:extLst/>
-          </a:lstStyle>
+          <a:lstStyle/>
           <a:p>
             <a:fld id="{73DA0BB7-265A-403C-9275-D587AB510EDC}" type="slidenum">
               <a:rPr lang="zh-TW" altLang="en-US" smtClean="0"/>
@@ -1302,9 +1270,7 @@
         </p:style>
         <p:txBody>
           <a:bodyPr anchor="ctr"/>
-          <a:lstStyle>
-            <a:extLst/>
-          </a:lstStyle>
+          <a:lstStyle/>
           <a:p>
             <a:pPr algn="ctr" eaLnBrk="1" latinLnBrk="0" hangingPunct="1"/>
             <a:endParaRPr kumimoji="0" lang="en-US"/>
@@ -1389,9 +1355,7 @@
         </p:style>
         <p:txBody>
           <a:bodyPr anchor="ctr"/>
-          <a:lstStyle>
-            <a:extLst/>
-          </a:lstStyle>
+          <a:lstStyle/>
           <a:p>
             <a:pPr algn="ctr" eaLnBrk="1" latinLnBrk="0" hangingPunct="1"/>
             <a:endParaRPr kumimoji="0" lang="en-US"/>
@@ -1440,9 +1404,7 @@
         </p:style>
         <p:txBody>
           <a:bodyPr anchor="ctr"/>
-          <a:lstStyle>
-            <a:extLst/>
-          </a:lstStyle>
+          <a:lstStyle/>
           <a:p>
             <a:pPr algn="ctr" eaLnBrk="1" latinLnBrk="0" hangingPunct="1"/>
             <a:endParaRPr kumimoji="0" lang="en-US"/>
@@ -1492,9 +1454,7 @@
         </p:spPr>
         <p:txBody>
           <a:bodyPr/>
-          <a:lstStyle>
-            <a:extLst/>
-          </a:lstStyle>
+          <a:lstStyle/>
           <a:p>
             <a:r>
               <a:rPr kumimoji="0" lang="zh-TW" altLang="en-US" smtClean="0"/>
@@ -1665,14 +1625,12 @@
         <p:spPr/>
         <p:txBody>
           <a:bodyPr/>
-          <a:lstStyle>
-            <a:extLst/>
-          </a:lstStyle>
+          <a:lstStyle/>
           <a:p>
             <a:fld id="{5BBEAD13-0566-4C6C-97E7-55F17F24B09F}" type="datetimeFigureOut">
               <a:rPr lang="zh-TW" altLang="en-US" smtClean="0"/>
               <a:pPr/>
-              <a:t>2020/7/2</a:t>
+              <a:t>2020/7/3</a:t>
             </a:fld>
             <a:endParaRPr lang="zh-TW" altLang="en-US"/>
           </a:p>
@@ -1691,9 +1649,7 @@
         <p:spPr/>
         <p:txBody>
           <a:bodyPr/>
-          <a:lstStyle>
-            <a:extLst/>
-          </a:lstStyle>
+          <a:lstStyle/>
           <a:p>
             <a:endParaRPr lang="zh-TW" altLang="en-US"/>
           </a:p>
@@ -1712,9 +1668,7 @@
         <p:spPr/>
         <p:txBody>
           <a:bodyPr/>
-          <a:lstStyle>
-            <a:extLst/>
-          </a:lstStyle>
+          <a:lstStyle/>
           <a:p>
             <a:fld id="{73DA0BB7-265A-403C-9275-D587AB510EDC}" type="slidenum">
               <a:rPr lang="zh-TW" altLang="en-US" smtClean="0"/>
@@ -2156,14 +2110,12 @@
         <p:spPr/>
         <p:txBody>
           <a:bodyPr/>
-          <a:lstStyle>
-            <a:extLst/>
-          </a:lstStyle>
+          <a:lstStyle/>
           <a:p>
             <a:fld id="{5BBEAD13-0566-4C6C-97E7-55F17F24B09F}" type="datetimeFigureOut">
               <a:rPr lang="zh-TW" altLang="en-US" smtClean="0"/>
               <a:pPr/>
-              <a:t>2020/7/2</a:t>
+              <a:t>2020/7/3</a:t>
             </a:fld>
             <a:endParaRPr lang="zh-TW" altLang="en-US"/>
           </a:p>
@@ -2182,9 +2134,7 @@
         <p:spPr/>
         <p:txBody>
           <a:bodyPr/>
-          <a:lstStyle>
-            <a:extLst/>
-          </a:lstStyle>
+          <a:lstStyle/>
           <a:p>
             <a:endParaRPr lang="zh-TW" altLang="en-US"/>
           </a:p>
@@ -2203,9 +2153,7 @@
         <p:spPr/>
         <p:txBody>
           <a:bodyPr/>
-          <a:lstStyle>
-            <a:extLst/>
-          </a:lstStyle>
+          <a:lstStyle/>
           <a:p>
             <a:fld id="{73DA0BB7-265A-403C-9275-D587AB510EDC}" type="slidenum">
               <a:rPr lang="zh-TW" altLang="en-US" smtClean="0"/>
@@ -2259,9 +2207,7 @@
         </p:spPr>
         <p:txBody>
           <a:bodyPr anchor="ctr"/>
-          <a:lstStyle>
-            <a:extLst/>
-          </a:lstStyle>
+          <a:lstStyle/>
           <a:p>
             <a:r>
               <a:rPr kumimoji="0" lang="zh-TW" altLang="en-US" smtClean="0"/>
@@ -2284,14 +2230,12 @@
         <p:spPr/>
         <p:txBody>
           <a:bodyPr/>
-          <a:lstStyle>
-            <a:extLst/>
-          </a:lstStyle>
+          <a:lstStyle/>
           <a:p>
             <a:fld id="{5BBEAD13-0566-4C6C-97E7-55F17F24B09F}" type="datetimeFigureOut">
               <a:rPr lang="zh-TW" altLang="en-US" smtClean="0"/>
               <a:pPr/>
-              <a:t>2020/7/2</a:t>
+              <a:t>2020/7/3</a:t>
             </a:fld>
             <a:endParaRPr lang="zh-TW" altLang="en-US"/>
           </a:p>
@@ -2310,9 +2254,7 @@
         <p:spPr/>
         <p:txBody>
           <a:bodyPr/>
-          <a:lstStyle>
-            <a:extLst/>
-          </a:lstStyle>
+          <a:lstStyle/>
           <a:p>
             <a:endParaRPr lang="zh-TW" altLang="en-US"/>
           </a:p>
@@ -2331,9 +2273,7 @@
         <p:spPr/>
         <p:txBody>
           <a:bodyPr/>
-          <a:lstStyle>
-            <a:extLst/>
-          </a:lstStyle>
+          <a:lstStyle/>
           <a:p>
             <a:fld id="{73DA0BB7-265A-403C-9275-D587AB510EDC}" type="slidenum">
               <a:rPr lang="zh-TW" altLang="en-US" smtClean="0"/>
@@ -2408,9 +2348,7 @@
         </p:style>
         <p:txBody>
           <a:bodyPr anchor="ctr"/>
-          <a:lstStyle>
-            <a:extLst/>
-          </a:lstStyle>
+          <a:lstStyle/>
           <a:p>
             <a:pPr algn="ctr" eaLnBrk="1" latinLnBrk="0" hangingPunct="1"/>
             <a:endParaRPr kumimoji="0" lang="en-US"/>
@@ -2430,14 +2368,12 @@
         <p:spPr/>
         <p:txBody>
           <a:bodyPr/>
-          <a:lstStyle>
-            <a:extLst/>
-          </a:lstStyle>
+          <a:lstStyle/>
           <a:p>
             <a:fld id="{5BBEAD13-0566-4C6C-97E7-55F17F24B09F}" type="datetimeFigureOut">
               <a:rPr lang="zh-TW" altLang="en-US" smtClean="0"/>
               <a:pPr/>
-              <a:t>2020/7/2</a:t>
+              <a:t>2020/7/3</a:t>
             </a:fld>
             <a:endParaRPr lang="zh-TW" altLang="en-US"/>
           </a:p>
@@ -2456,9 +2392,7 @@
         <p:spPr/>
         <p:txBody>
           <a:bodyPr/>
-          <a:lstStyle>
-            <a:extLst/>
-          </a:lstStyle>
+          <a:lstStyle/>
           <a:p>
             <a:endParaRPr lang="zh-TW" altLang="en-US"/>
           </a:p>
@@ -2477,9 +2411,7 @@
         <p:spPr/>
         <p:txBody>
           <a:bodyPr/>
-          <a:lstStyle>
-            <a:extLst/>
-          </a:lstStyle>
+          <a:lstStyle/>
           <a:p>
             <a:fld id="{73DA0BB7-265A-403C-9275-D587AB510EDC}" type="slidenum">
               <a:rPr lang="zh-TW" altLang="en-US" smtClean="0"/>
@@ -2537,9 +2469,7 @@
         </p:style>
         <p:txBody>
           <a:bodyPr anchor="ctr"/>
-          <a:lstStyle>
-            <a:extLst/>
-          </a:lstStyle>
+          <a:lstStyle/>
           <a:p>
             <a:pPr algn="ctr" eaLnBrk="1" latinLnBrk="0" hangingPunct="1"/>
             <a:endParaRPr kumimoji="0" lang="en-US"/>
@@ -2754,14 +2684,12 @@
         <p:spPr/>
         <p:txBody>
           <a:bodyPr/>
-          <a:lstStyle>
-            <a:extLst/>
-          </a:lstStyle>
+          <a:lstStyle/>
           <a:p>
             <a:fld id="{5BBEAD13-0566-4C6C-97E7-55F17F24B09F}" type="datetimeFigureOut">
               <a:rPr lang="zh-TW" altLang="en-US" smtClean="0"/>
               <a:pPr/>
-              <a:t>2020/7/2</a:t>
+              <a:t>2020/7/3</a:t>
             </a:fld>
             <a:endParaRPr lang="zh-TW" altLang="en-US"/>
           </a:p>
@@ -2780,9 +2708,7 @@
         <p:spPr/>
         <p:txBody>
           <a:bodyPr/>
-          <a:lstStyle>
-            <a:extLst/>
-          </a:lstStyle>
+          <a:lstStyle/>
           <a:p>
             <a:endParaRPr lang="zh-TW" altLang="en-US"/>
           </a:p>
@@ -2801,9 +2727,7 @@
         <p:spPr/>
         <p:txBody>
           <a:bodyPr/>
-          <a:lstStyle>
-            <a:extLst/>
-          </a:lstStyle>
+          <a:lstStyle/>
           <a:p>
             <a:fld id="{73DA0BB7-265A-403C-9275-D587AB510EDC}" type="slidenum">
               <a:rPr lang="zh-TW" altLang="en-US" smtClean="0"/>
@@ -2890,14 +2814,12 @@
         <p:spPr/>
         <p:txBody>
           <a:bodyPr/>
-          <a:lstStyle>
-            <a:extLst/>
-          </a:lstStyle>
+          <a:lstStyle/>
           <a:p>
             <a:fld id="{5BBEAD13-0566-4C6C-97E7-55F17F24B09F}" type="datetimeFigureOut">
               <a:rPr lang="zh-TW" altLang="en-US" smtClean="0"/>
               <a:pPr/>
-              <a:t>2020/7/2</a:t>
+              <a:t>2020/7/3</a:t>
             </a:fld>
             <a:endParaRPr lang="zh-TW" altLang="en-US"/>
           </a:p>
@@ -2916,9 +2838,7 @@
         <p:spPr/>
         <p:txBody>
           <a:bodyPr/>
-          <a:lstStyle>
-            <a:extLst/>
-          </a:lstStyle>
+          <a:lstStyle/>
           <a:p>
             <a:endParaRPr lang="zh-TW" altLang="en-US"/>
           </a:p>
@@ -2937,9 +2857,7 @@
         <p:spPr/>
         <p:txBody>
           <a:bodyPr/>
-          <a:lstStyle>
-            <a:extLst/>
-          </a:lstStyle>
+          <a:lstStyle/>
           <a:p>
             <a:fld id="{73DA0BB7-265A-403C-9275-D587AB510EDC}" type="slidenum">
               <a:rPr lang="zh-TW" altLang="en-US" smtClean="0"/>
@@ -2997,9 +2915,7 @@
           <a:bodyPr lIns="91440" tIns="274320" rtlCol="0" anchor="t">
             <a:normAutofit/>
           </a:bodyPr>
-          <a:lstStyle>
-            <a:extLst/>
-          </a:lstStyle>
+          <a:lstStyle/>
           <a:p>
             <a:pPr marL="0" indent="-283464" algn="l" rtl="0" eaLnBrk="1" latinLnBrk="0" hangingPunct="1">
               <a:lnSpc>
@@ -3127,9 +3043,7 @@
         </p:style>
         <p:txBody>
           <a:bodyPr anchor="ctr"/>
-          <a:lstStyle>
-            <a:extLst/>
-          </a:lstStyle>
+          <a:lstStyle/>
           <a:p>
             <a:pPr algn="ctr" eaLnBrk="1" latinLnBrk="0" hangingPunct="1"/>
             <a:endParaRPr kumimoji="0" lang="en-US"/>
@@ -3187,9 +3101,7 @@
         </p:style>
         <p:txBody>
           <a:bodyPr anchor="ctr"/>
-          <a:lstStyle>
-            <a:extLst/>
-          </a:lstStyle>
+          <a:lstStyle/>
           <a:p>
             <a:pPr algn="ctr" eaLnBrk="1" latinLnBrk="0" hangingPunct="1"/>
             <a:endParaRPr kumimoji="0" lang="en-US" dirty="0"/>
@@ -3334,9 +3246,7 @@
         </p:style>
         <p:txBody>
           <a:bodyPr anchor="ctr"/>
-          <a:lstStyle>
-            <a:extLst/>
-          </a:lstStyle>
+          <a:lstStyle/>
           <a:p>
             <a:pPr algn="ctr" eaLnBrk="1" latinLnBrk="0" hangingPunct="1"/>
             <a:endParaRPr kumimoji="0" lang="en-US"/>
@@ -3394,9 +3304,7 @@
         </p:style>
         <p:txBody>
           <a:bodyPr anchor="ctr"/>
-          <a:lstStyle>
-            <a:extLst/>
-          </a:lstStyle>
+          <a:lstStyle/>
           <a:p>
             <a:pPr algn="ctr" eaLnBrk="1" latinLnBrk="0" hangingPunct="1"/>
             <a:endParaRPr kumimoji="0" lang="en-US"/>
@@ -3486,9 +3394,7 @@
         </p:style>
         <p:txBody>
           <a:bodyPr anchor="ctr"/>
-          <a:lstStyle>
-            <a:extLst/>
-          </a:lstStyle>
+          <a:lstStyle/>
           <a:p>
             <a:pPr algn="ctr" eaLnBrk="1" latinLnBrk="0" hangingPunct="1"/>
             <a:endParaRPr kumimoji="0" lang="en-US"/>
@@ -3534,9 +3440,7 @@
         </p:style>
         <p:txBody>
           <a:bodyPr anchor="ctr"/>
-          <a:lstStyle>
-            <a:extLst/>
-          </a:lstStyle>
+          <a:lstStyle/>
           <a:p>
             <a:pPr algn="ctr" eaLnBrk="1" latinLnBrk="0" hangingPunct="1"/>
             <a:endParaRPr kumimoji="0" lang="en-US"/>
@@ -3566,9 +3470,7 @@
           <a:bodyPr anchor="ctr">
             <a:normAutofit/>
           </a:bodyPr>
-          <a:lstStyle>
-            <a:extLst/>
-          </a:lstStyle>
+          <a:lstStyle/>
           <a:p>
             <a:r>
               <a:rPr kumimoji="0" lang="zh-TW" altLang="en-US" smtClean="0"/>
@@ -3601,9 +3503,7 @@
           <a:bodyPr>
             <a:normAutofit/>
           </a:bodyPr>
-          <a:lstStyle>
-            <a:extLst/>
-          </a:lstStyle>
+          <a:lstStyle/>
           <a:p>
             <a:pPr lvl="0" eaLnBrk="1" latinLnBrk="0" hangingPunct="1"/>
             <a:r>
@@ -3680,7 +3580,7 @@
             <a:fld id="{5BBEAD13-0566-4C6C-97E7-55F17F24B09F}" type="datetimeFigureOut">
               <a:rPr lang="zh-TW" altLang="en-US" smtClean="0"/>
               <a:pPr/>
-              <a:t>2020/7/2</a:t>
+              <a:t>2020/7/3</a:t>
             </a:fld>
             <a:endParaRPr lang="zh-TW" altLang="en-US"/>
           </a:p>
@@ -3818,9 +3718,7 @@
         </p:style>
         <p:txBody>
           <a:bodyPr anchor="ctr"/>
-          <a:lstStyle>
-            <a:extLst/>
-          </a:lstStyle>
+          <a:lstStyle/>
           <a:p>
             <a:pPr algn="ctr" eaLnBrk="1" latinLnBrk="0" hangingPunct="1"/>
             <a:endParaRPr kumimoji="0" lang="en-US"/>
@@ -4445,11 +4343,7 @@
           <a:p>
             <a:r>
               <a:rPr lang="zh-TW" altLang="en-US" dirty="0" smtClean="0"/>
-              <a:t>故事本體</a:t>
-            </a:r>
-            <a:r>
-              <a:rPr lang="zh-TW" altLang="en-US" dirty="0" smtClean="0"/>
-              <a:t>展示</a:t>
+              <a:t>故事本體展示</a:t>
             </a:r>
             <a:endParaRPr lang="zh-TW" altLang="en-US" dirty="0"/>
           </a:p>
@@ -4709,11 +4603,7 @@
           <a:p>
             <a:r>
               <a:rPr lang="zh-TW" altLang="en-US" dirty="0" smtClean="0"/>
-              <a:t>故事本體</a:t>
-            </a:r>
-            <a:r>
-              <a:rPr lang="zh-TW" altLang="en-US" dirty="0" smtClean="0"/>
-              <a:t>展示</a:t>
+              <a:t>故事本體展示</a:t>
             </a:r>
             <a:endParaRPr lang="en-US" altLang="zh-TW" dirty="0" smtClean="0"/>
           </a:p>
@@ -4825,37 +4715,17 @@
             </a:r>
             <a:r>
               <a:rPr lang="zh-TW" altLang="en-US" dirty="0" smtClean="0"/>
-              <a:t>的命令，踏上了尋找傳說神器的</a:t>
-            </a:r>
+              <a:t>的命令，踏上了尋找傳說神器的旅途。</a:t>
+            </a:r>
+            <a:endParaRPr lang="en-US" altLang="zh-TW" dirty="0" smtClean="0"/>
+          </a:p>
+          <a:p>
+            <a:endParaRPr lang="en-US" altLang="zh-TW" dirty="0" smtClean="0"/>
+          </a:p>
+          <a:p>
             <a:r>
               <a:rPr lang="zh-TW" altLang="en-US" dirty="0" smtClean="0"/>
-              <a:t>旅途。</a:t>
-            </a:r>
-            <a:endParaRPr lang="en-US" altLang="zh-TW" dirty="0" smtClean="0"/>
-          </a:p>
-          <a:p>
-            <a:endParaRPr lang="en-US" altLang="zh-TW" dirty="0" smtClean="0"/>
-          </a:p>
-          <a:p>
-            <a:r>
-              <a:rPr lang="zh-TW" altLang="en-US" dirty="0" smtClean="0"/>
-              <a:t>簡</a:t>
-            </a:r>
-            <a:r>
-              <a:rPr lang="zh-TW" altLang="en-US" dirty="0" smtClean="0"/>
-              <a:t>言</a:t>
-            </a:r>
-            <a:r>
-              <a:rPr lang="zh-TW" altLang="en-US" dirty="0" smtClean="0"/>
-              <a:t>之就是主角齊格與弗里德兩人尋找</a:t>
-            </a:r>
-            <a:r>
-              <a:rPr lang="zh-TW" altLang="en-US" dirty="0" smtClean="0"/>
-              <a:t>神</a:t>
-            </a:r>
-            <a:r>
-              <a:rPr lang="zh-TW" altLang="en-US" dirty="0" smtClean="0"/>
-              <a:t>器一同踏上屠龍之旅的物語。</a:t>
+              <a:t>簡言之就是主角齊格與弗里德兩人尋找神器一同踏上屠龍之旅的物語。</a:t>
             </a:r>
             <a:endParaRPr lang="zh-TW" altLang="en-US" dirty="0"/>
           </a:p>
@@ -5114,7 +4984,11 @@
           <a:p>
             <a:r>
               <a:rPr lang="zh-TW" altLang="en-US" dirty="0" smtClean="0"/>
-              <a:t>故事流程圖</a:t>
+              <a:t>故事</a:t>
+            </a:r>
+            <a:r>
+              <a:rPr lang="zh-TW" altLang="en-US" dirty="0" smtClean="0"/>
+              <a:t>流程圖</a:t>
             </a:r>
             <a:endParaRPr lang="zh-TW" altLang="en-US" dirty="0"/>
           </a:p>
@@ -5137,16 +5011,36 @@
           <a:p>
             <a:r>
               <a:rPr lang="zh-TW" altLang="en-US" dirty="0" smtClean="0"/>
-              <a:t>總共可以分成三個部分</a:t>
-            </a:r>
-            <a:r>
-              <a:rPr lang="zh-TW" altLang="en-US" dirty="0" smtClean="0"/>
-              <a:t>、四條故事線</a:t>
+              <a:t>總共可以分成三個部分、四條故事線</a:t>
             </a:r>
             <a:endParaRPr lang="zh-TW" altLang="en-US" dirty="0"/>
           </a:p>
         </p:txBody>
       </p:sp>
+      <p:pic>
+        <p:nvPicPr>
+          <p:cNvPr id="4" name="圖片 3"/>
+          <p:cNvPicPr>
+            <a:picLocks noChangeAspect="1"/>
+          </p:cNvPicPr>
+          <p:nvPr/>
+        </p:nvPicPr>
+        <p:blipFill>
+          <a:blip r:embed="rId2"/>
+          <a:stretch>
+            <a:fillRect/>
+          </a:stretch>
+        </p:blipFill>
+        <p:spPr>
+          <a:xfrm>
+            <a:off x="12034" y="2708920"/>
+            <a:ext cx="9167486" cy="1430285"/>
+          </a:xfrm>
+          <a:prstGeom prst="rect">
+            <a:avLst/>
+          </a:prstGeom>
+        </p:spPr>
+      </p:pic>
     </p:spTree>
   </p:cSld>
   <p:clrMapOvr>
@@ -5278,6 +5172,30 @@
           </a:p>
         </p:txBody>
       </p:sp>
+      <p:pic>
+        <p:nvPicPr>
+          <p:cNvPr id="3" name="圖片 2"/>
+          <p:cNvPicPr>
+            <a:picLocks noChangeAspect="1"/>
+          </p:cNvPicPr>
+          <p:nvPr/>
+        </p:nvPicPr>
+        <p:blipFill>
+          <a:blip r:embed="rId3"/>
+          <a:stretch>
+            <a:fillRect/>
+          </a:stretch>
+        </p:blipFill>
+        <p:spPr>
+          <a:xfrm>
+            <a:off x="1389289" y="5373216"/>
+            <a:ext cx="4104456" cy="1380522"/>
+          </a:xfrm>
+          <a:prstGeom prst="rect">
+            <a:avLst/>
+          </a:prstGeom>
+        </p:spPr>
+      </p:pic>
     </p:spTree>
   </p:cSld>
   <p:clrMapOvr>
@@ -5401,6 +5319,30 @@
           </a:p>
         </p:txBody>
       </p:sp>
+      <p:pic>
+        <p:nvPicPr>
+          <p:cNvPr id="6" name="圖片 5"/>
+          <p:cNvPicPr>
+            <a:picLocks noChangeAspect="1"/>
+          </p:cNvPicPr>
+          <p:nvPr/>
+        </p:nvPicPr>
+        <p:blipFill>
+          <a:blip r:embed="rId3"/>
+          <a:stretch>
+            <a:fillRect/>
+          </a:stretch>
+        </p:blipFill>
+        <p:spPr>
+          <a:xfrm>
+            <a:off x="-25113" y="5013176"/>
+            <a:ext cx="5004047" cy="1567669"/>
+          </a:xfrm>
+          <a:prstGeom prst="rect">
+            <a:avLst/>
+          </a:prstGeom>
+        </p:spPr>
+      </p:pic>
     </p:spTree>
   </p:cSld>
   <p:clrMapOvr>
@@ -5409,7 +5351,83 @@
   <p:timing>
     <p:tnLst>
       <p:par>
-        <p:cTn id="1" dur="indefinite" restart="never" nodeType="tmRoot"/>
+        <p:cTn id="1" dur="indefinite" restart="never" nodeType="tmRoot">
+          <p:childTnLst>
+            <p:seq concurrent="1" nextAc="seek">
+              <p:cTn id="2" dur="indefinite" nodeType="mainSeq">
+                <p:childTnLst>
+                  <p:par>
+                    <p:cTn id="3" fill="hold">
+                      <p:stCondLst>
+                        <p:cond delay="indefinite"/>
+                      </p:stCondLst>
+                      <p:childTnLst>
+                        <p:par>
+                          <p:cTn id="4" fill="hold">
+                            <p:stCondLst>
+                              <p:cond delay="0"/>
+                            </p:stCondLst>
+                            <p:childTnLst>
+                              <p:par>
+                                <p:cTn id="5" presetID="10" presetClass="entr" presetSubtype="0" fill="hold" nodeType="clickEffect">
+                                  <p:stCondLst>
+                                    <p:cond delay="0"/>
+                                  </p:stCondLst>
+                                  <p:childTnLst>
+                                    <p:set>
+                                      <p:cBhvr>
+                                        <p:cTn id="6" dur="1" fill="hold">
+                                          <p:stCondLst>
+                                            <p:cond delay="0"/>
+                                          </p:stCondLst>
+                                        </p:cTn>
+                                        <p:tgtEl>
+                                          <p:spTgt spid="6"/>
+                                        </p:tgtEl>
+                                        <p:attrNameLst>
+                                          <p:attrName>style.visibility</p:attrName>
+                                        </p:attrNameLst>
+                                      </p:cBhvr>
+                                      <p:to>
+                                        <p:strVal val="visible"/>
+                                      </p:to>
+                                    </p:set>
+                                    <p:animEffect transition="in" filter="fade">
+                                      <p:cBhvr>
+                                        <p:cTn id="7" dur="500"/>
+                                        <p:tgtEl>
+                                          <p:spTgt spid="6"/>
+                                        </p:tgtEl>
+                                      </p:cBhvr>
+                                    </p:animEffect>
+                                  </p:childTnLst>
+                                </p:cTn>
+                              </p:par>
+                            </p:childTnLst>
+                          </p:cTn>
+                        </p:par>
+                      </p:childTnLst>
+                    </p:cTn>
+                  </p:par>
+                </p:childTnLst>
+              </p:cTn>
+              <p:prevCondLst>
+                <p:cond evt="onPrev" delay="0">
+                  <p:tgtEl>
+                    <p:sldTgt/>
+                  </p:tgtEl>
+                </p:cond>
+              </p:prevCondLst>
+              <p:nextCondLst>
+                <p:cond evt="onNext" delay="0">
+                  <p:tgtEl>
+                    <p:sldTgt/>
+                  </p:tgtEl>
+                </p:cond>
+              </p:nextCondLst>
+            </p:seq>
+          </p:childTnLst>
+        </p:cTn>
       </p:par>
     </p:tnLst>
   </p:timing>
@@ -5518,15 +5536,7 @@
           <a:p>
             <a:r>
               <a:rPr lang="zh-TW" altLang="en-US" dirty="0" smtClean="0"/>
-              <a:t>各條線會</a:t>
-            </a:r>
-            <a:r>
-              <a:rPr lang="zh-TW" altLang="en-US" dirty="0" smtClean="0"/>
-              <a:t>迎</a:t>
-            </a:r>
-            <a:r>
-              <a:rPr lang="zh-TW" altLang="en-US" dirty="0" smtClean="0"/>
-              <a:t>來各自的</a:t>
+              <a:t>各條線會迎來各自的</a:t>
             </a:r>
             <a:endParaRPr lang="en-US" altLang="zh-TW" dirty="0" smtClean="0"/>
           </a:p>
@@ -5547,6 +5557,30 @@
           </a:p>
         </p:txBody>
       </p:sp>
+      <p:pic>
+        <p:nvPicPr>
+          <p:cNvPr id="3" name="圖片 2"/>
+          <p:cNvPicPr>
+            <a:picLocks noChangeAspect="1"/>
+          </p:cNvPicPr>
+          <p:nvPr/>
+        </p:nvPicPr>
+        <p:blipFill>
+          <a:blip r:embed="rId3"/>
+          <a:stretch>
+            <a:fillRect/>
+          </a:stretch>
+        </p:blipFill>
+        <p:spPr>
+          <a:xfrm>
+            <a:off x="-32027" y="4371975"/>
+            <a:ext cx="3781425" cy="2486025"/>
+          </a:xfrm>
+          <a:prstGeom prst="rect">
+            <a:avLst/>
+          </a:prstGeom>
+        </p:spPr>
+      </p:pic>
     </p:spTree>
   </p:cSld>
   <p:clrMapOvr>
@@ -5555,7 +5589,83 @@
   <p:timing>
     <p:tnLst>
       <p:par>
-        <p:cTn id="1" dur="indefinite" restart="never" nodeType="tmRoot"/>
+        <p:cTn id="1" dur="indefinite" restart="never" nodeType="tmRoot">
+          <p:childTnLst>
+            <p:seq concurrent="1" nextAc="seek">
+              <p:cTn id="2" dur="indefinite" nodeType="mainSeq">
+                <p:childTnLst>
+                  <p:par>
+                    <p:cTn id="3" fill="hold">
+                      <p:stCondLst>
+                        <p:cond delay="indefinite"/>
+                      </p:stCondLst>
+                      <p:childTnLst>
+                        <p:par>
+                          <p:cTn id="4" fill="hold">
+                            <p:stCondLst>
+                              <p:cond delay="0"/>
+                            </p:stCondLst>
+                            <p:childTnLst>
+                              <p:par>
+                                <p:cTn id="5" presetID="10" presetClass="entr" presetSubtype="0" fill="hold" nodeType="clickEffect">
+                                  <p:stCondLst>
+                                    <p:cond delay="0"/>
+                                  </p:stCondLst>
+                                  <p:childTnLst>
+                                    <p:set>
+                                      <p:cBhvr>
+                                        <p:cTn id="6" dur="1" fill="hold">
+                                          <p:stCondLst>
+                                            <p:cond delay="0"/>
+                                          </p:stCondLst>
+                                        </p:cTn>
+                                        <p:tgtEl>
+                                          <p:spTgt spid="3"/>
+                                        </p:tgtEl>
+                                        <p:attrNameLst>
+                                          <p:attrName>style.visibility</p:attrName>
+                                        </p:attrNameLst>
+                                      </p:cBhvr>
+                                      <p:to>
+                                        <p:strVal val="visible"/>
+                                      </p:to>
+                                    </p:set>
+                                    <p:animEffect transition="in" filter="fade">
+                                      <p:cBhvr>
+                                        <p:cTn id="7" dur="500"/>
+                                        <p:tgtEl>
+                                          <p:spTgt spid="3"/>
+                                        </p:tgtEl>
+                                      </p:cBhvr>
+                                    </p:animEffect>
+                                  </p:childTnLst>
+                                </p:cTn>
+                              </p:par>
+                            </p:childTnLst>
+                          </p:cTn>
+                        </p:par>
+                      </p:childTnLst>
+                    </p:cTn>
+                  </p:par>
+                </p:childTnLst>
+              </p:cTn>
+              <p:prevCondLst>
+                <p:cond evt="onPrev" delay="0">
+                  <p:tgtEl>
+                    <p:sldTgt/>
+                  </p:tgtEl>
+                </p:cond>
+              </p:prevCondLst>
+              <p:nextCondLst>
+                <p:cond evt="onNext" delay="0">
+                  <p:tgtEl>
+                    <p:sldTgt/>
+                  </p:tgtEl>
+                </p:cond>
+              </p:nextCondLst>
+            </p:seq>
+          </p:childTnLst>
+        </p:cTn>
       </p:par>
     </p:tnLst>
   </p:timing>

</xml_diff>